<commit_message>
2018-06-27, after meeting Andre
</commit_message>
<xml_diff>
--- a/doc/tex/algorithms/hilbert/figures/test_setup.pptx
+++ b/doc/tex/algorithms/hilbert/figures/test_setup.pptx
@@ -243,7 +243,7 @@
           <a:p>
             <a:fld id="{2680F75E-BF8A-4352-8DF2-5712531B63DB}" type="datetimeFigureOut">
               <a:rPr lang="pt-PT" smtClean="0"/>
-              <a:t>25/03/2018</a:t>
+              <a:t>21/05/2018</a:t>
             </a:fld>
             <a:endParaRPr lang="pt-PT"/>
           </a:p>
@@ -413,7 +413,7 @@
           <a:p>
             <a:fld id="{2680F75E-BF8A-4352-8DF2-5712531B63DB}" type="datetimeFigureOut">
               <a:rPr lang="pt-PT" smtClean="0"/>
-              <a:t>25/03/2018</a:t>
+              <a:t>21/05/2018</a:t>
             </a:fld>
             <a:endParaRPr lang="pt-PT"/>
           </a:p>
@@ -593,7 +593,7 @@
           <a:p>
             <a:fld id="{2680F75E-BF8A-4352-8DF2-5712531B63DB}" type="datetimeFigureOut">
               <a:rPr lang="pt-PT" smtClean="0"/>
-              <a:t>25/03/2018</a:t>
+              <a:t>21/05/2018</a:t>
             </a:fld>
             <a:endParaRPr lang="pt-PT"/>
           </a:p>
@@ -763,7 +763,7 @@
           <a:p>
             <a:fld id="{2680F75E-BF8A-4352-8DF2-5712531B63DB}" type="datetimeFigureOut">
               <a:rPr lang="pt-PT" smtClean="0"/>
-              <a:t>25/03/2018</a:t>
+              <a:t>21/05/2018</a:t>
             </a:fld>
             <a:endParaRPr lang="pt-PT"/>
           </a:p>
@@ -1009,7 +1009,7 @@
           <a:p>
             <a:fld id="{2680F75E-BF8A-4352-8DF2-5712531B63DB}" type="datetimeFigureOut">
               <a:rPr lang="pt-PT" smtClean="0"/>
-              <a:t>25/03/2018</a:t>
+              <a:t>21/05/2018</a:t>
             </a:fld>
             <a:endParaRPr lang="pt-PT"/>
           </a:p>
@@ -1241,7 +1241,7 @@
           <a:p>
             <a:fld id="{2680F75E-BF8A-4352-8DF2-5712531B63DB}" type="datetimeFigureOut">
               <a:rPr lang="pt-PT" smtClean="0"/>
-              <a:t>25/03/2018</a:t>
+              <a:t>21/05/2018</a:t>
             </a:fld>
             <a:endParaRPr lang="pt-PT"/>
           </a:p>
@@ -1608,7 +1608,7 @@
           <a:p>
             <a:fld id="{2680F75E-BF8A-4352-8DF2-5712531B63DB}" type="datetimeFigureOut">
               <a:rPr lang="pt-PT" smtClean="0"/>
-              <a:t>25/03/2018</a:t>
+              <a:t>21/05/2018</a:t>
             </a:fld>
             <a:endParaRPr lang="pt-PT"/>
           </a:p>
@@ -1726,7 +1726,7 @@
           <a:p>
             <a:fld id="{2680F75E-BF8A-4352-8DF2-5712531B63DB}" type="datetimeFigureOut">
               <a:rPr lang="pt-PT" smtClean="0"/>
-              <a:t>25/03/2018</a:t>
+              <a:t>21/05/2018</a:t>
             </a:fld>
             <a:endParaRPr lang="pt-PT"/>
           </a:p>
@@ -1821,7 +1821,7 @@
           <a:p>
             <a:fld id="{2680F75E-BF8A-4352-8DF2-5712531B63DB}" type="datetimeFigureOut">
               <a:rPr lang="pt-PT" smtClean="0"/>
-              <a:t>25/03/2018</a:t>
+              <a:t>21/05/2018</a:t>
             </a:fld>
             <a:endParaRPr lang="pt-PT"/>
           </a:p>
@@ -2098,7 +2098,7 @@
           <a:p>
             <a:fld id="{2680F75E-BF8A-4352-8DF2-5712531B63DB}" type="datetimeFigureOut">
               <a:rPr lang="pt-PT" smtClean="0"/>
-              <a:t>25/03/2018</a:t>
+              <a:t>21/05/2018</a:t>
             </a:fld>
             <a:endParaRPr lang="pt-PT"/>
           </a:p>
@@ -2351,7 +2351,7 @@
           <a:p>
             <a:fld id="{2680F75E-BF8A-4352-8DF2-5712531B63DB}" type="datetimeFigureOut">
               <a:rPr lang="pt-PT" smtClean="0"/>
-              <a:t>25/03/2018</a:t>
+              <a:t>21/05/2018</a:t>
             </a:fld>
             <a:endParaRPr lang="pt-PT"/>
           </a:p>
@@ -2564,7 +2564,7 @@
           <a:p>
             <a:fld id="{2680F75E-BF8A-4352-8DF2-5712531B63DB}" type="datetimeFigureOut">
               <a:rPr lang="pt-PT" smtClean="0"/>
-              <a:t>25/03/2018</a:t>
+              <a:t>21/05/2018</a:t>
             </a:fld>
             <a:endParaRPr lang="pt-PT"/>
           </a:p>
@@ -2971,14 +2971,14 @@
       </p:grpSpPr>
       <p:sp>
         <p:nvSpPr>
-          <p:cNvPr id="155" name="Rounded Rectangle 154"/>
+          <p:cNvPr id="178" name="Rounded Rectangle 177"/>
           <p:cNvSpPr/>
           <p:nvPr/>
         </p:nvSpPr>
         <p:spPr>
           <a:xfrm>
-            <a:off x="4513219" y="2734323"/>
-            <a:ext cx="1666553" cy="1003495"/>
+            <a:off x="70379" y="2734323"/>
+            <a:ext cx="1249896" cy="878890"/>
           </a:xfrm>
           <a:prstGeom prst="roundRect">
             <a:avLst/>
@@ -3005,124 +3005,12 @@
           <a:p>
             <a:pPr algn="ctr"/>
             <a:r>
-              <a:rPr lang="en-US" b="1" dirty="0" smtClean="0">
-                <a:latin typeface="+mj-lt"/>
-              </a:rPr>
-              <a:t>Discrete to</a:t>
-            </a:r>
-          </a:p>
-          <a:p>
-            <a:pPr algn="ctr"/>
-            <a:r>
-              <a:rPr lang="en-US" b="1" dirty="0" smtClean="0">
-                <a:latin typeface="+mj-lt"/>
-              </a:rPr>
-              <a:t>Continuous</a:t>
-            </a:r>
-          </a:p>
-          <a:p>
-            <a:pPr algn="ctr"/>
-            <a:r>
-              <a:rPr lang="en-US" b="1" dirty="0" smtClean="0">
-                <a:latin typeface="+mj-lt"/>
-              </a:rPr>
-              <a:t>Time</a:t>
-            </a:r>
-            <a:endParaRPr lang="en-US" b="1" dirty="0">
-              <a:latin typeface="+mj-lt"/>
-            </a:endParaRPr>
-          </a:p>
-        </p:txBody>
-      </p:sp>
-      <p:sp>
-        <p:nvSpPr>
-          <p:cNvPr id="177" name="Rounded Rectangle 176"/>
-          <p:cNvSpPr/>
-          <p:nvPr/>
-        </p:nvSpPr>
-        <p:spPr>
-          <a:xfrm>
-            <a:off x="2291784" y="2734322"/>
-            <a:ext cx="1666553" cy="1003495"/>
-          </a:xfrm>
-          <a:prstGeom prst="roundRect">
-            <a:avLst/>
-          </a:prstGeom>
-          <a:ln w="19050"/>
-        </p:spPr>
-        <p:style>
-          <a:lnRef idx="2">
-            <a:schemeClr val="dk1"/>
-          </a:lnRef>
-          <a:fillRef idx="1">
-            <a:schemeClr val="lt1"/>
-          </a:fillRef>
-          <a:effectRef idx="0">
-            <a:schemeClr val="dk1"/>
-          </a:effectRef>
-          <a:fontRef idx="minor">
-            <a:schemeClr val="dk1"/>
-          </a:fontRef>
-        </p:style>
-        <p:txBody>
-          <a:bodyPr rtlCol="0" anchor="ctr"/>
-          <a:lstStyle/>
-          <a:p>
-            <a:pPr algn="ctr"/>
-            <a:r>
-              <a:rPr lang="en-US" b="1" dirty="0" smtClean="0">
-                <a:latin typeface="+mj-lt"/>
-              </a:rPr>
-              <a:t>MPAM Mapping</a:t>
-            </a:r>
-            <a:endParaRPr lang="en-US" b="1" dirty="0">
-              <a:latin typeface="+mj-lt"/>
-            </a:endParaRPr>
-          </a:p>
-        </p:txBody>
-      </p:sp>
-      <p:sp>
-        <p:nvSpPr>
-          <p:cNvPr id="178" name="Rounded Rectangle 177"/>
-          <p:cNvSpPr/>
-          <p:nvPr/>
-        </p:nvSpPr>
-        <p:spPr>
-          <a:xfrm>
-            <a:off x="70378" y="2734322"/>
-            <a:ext cx="1666553" cy="1003495"/>
-          </a:xfrm>
-          <a:prstGeom prst="roundRect">
-            <a:avLst/>
-          </a:prstGeom>
-          <a:ln w="19050"/>
-        </p:spPr>
-        <p:style>
-          <a:lnRef idx="2">
-            <a:schemeClr val="dk1"/>
-          </a:lnRef>
-          <a:fillRef idx="1">
-            <a:schemeClr val="lt1"/>
-          </a:fillRef>
-          <a:effectRef idx="0">
-            <a:schemeClr val="dk1"/>
-          </a:effectRef>
-          <a:fontRef idx="minor">
-            <a:schemeClr val="dk1"/>
-          </a:fontRef>
-        </p:style>
-        <p:txBody>
-          <a:bodyPr rtlCol="0" anchor="ctr"/>
-          <a:lstStyle/>
-          <a:p>
-            <a:pPr algn="ctr"/>
-            <a:r>
-              <a:rPr lang="en-US" b="1" dirty="0" smtClean="0">
+              <a:rPr lang="en-US" dirty="0" smtClean="0">
                 <a:latin typeface="+mj-lt"/>
               </a:rPr>
               <a:t>Binary Sequence</a:t>
             </a:r>
-            <a:endParaRPr lang="en-US" b="1" dirty="0">
+            <a:endParaRPr lang="en-US" dirty="0">
               <a:latin typeface="+mj-lt"/>
             </a:endParaRPr>
           </a:p>
@@ -3133,14 +3021,14 @@
           <p:cNvPr id="159" name="Straight Arrow Connector 158"/>
           <p:cNvCxnSpPr>
             <a:stCxn id="178" idx="3"/>
-            <a:endCxn id="177" idx="1"/>
+            <a:endCxn id="53" idx="1"/>
           </p:cNvCxnSpPr>
           <p:nvPr/>
         </p:nvCxnSpPr>
         <p:spPr>
           <a:xfrm>
-            <a:off x="1736931" y="3236070"/>
-            <a:ext cx="554853" cy="0"/>
+            <a:off x="1320275" y="3173768"/>
+            <a:ext cx="551056" cy="0"/>
           </a:xfrm>
           <a:prstGeom prst="straightConnector1">
             <a:avLst/>
@@ -3168,15 +3056,15 @@
         <p:nvCxnSpPr>
           <p:cNvPr id="184" name="Straight Arrow Connector 183"/>
           <p:cNvCxnSpPr>
-            <a:stCxn id="177" idx="3"/>
-            <a:endCxn id="155" idx="1"/>
+            <a:stCxn id="53" idx="3"/>
+            <a:endCxn id="67" idx="1"/>
           </p:cNvCxnSpPr>
           <p:nvPr/>
         </p:nvCxnSpPr>
         <p:spPr>
           <a:xfrm>
-            <a:off x="3958338" y="3236070"/>
-            <a:ext cx="554880" cy="1"/>
+            <a:off x="3121227" y="3173768"/>
+            <a:ext cx="545514" cy="0"/>
           </a:xfrm>
           <a:prstGeom prst="straightConnector1">
             <a:avLst/>
@@ -3204,14 +3092,15 @@
         <p:nvCxnSpPr>
           <p:cNvPr id="185" name="Straight Arrow Connector 184"/>
           <p:cNvCxnSpPr>
-            <a:stCxn id="155" idx="3"/>
+            <a:stCxn id="67" idx="3"/>
+            <a:endCxn id="69" idx="1"/>
           </p:cNvCxnSpPr>
           <p:nvPr/>
         </p:nvCxnSpPr>
         <p:spPr>
-          <a:xfrm flipV="1">
-            <a:off x="6179772" y="3236070"/>
-            <a:ext cx="554823" cy="1"/>
+          <a:xfrm>
+            <a:off x="4978351" y="3173768"/>
+            <a:ext cx="547308" cy="0"/>
           </a:xfrm>
           <a:prstGeom prst="straightConnector1">
             <a:avLst/>
@@ -3235,8 +3124,8 @@
           </a:fontRef>
         </p:style>
       </p:cxnSp>
-      <mc:AlternateContent xmlns:mc="http://schemas.openxmlformats.org/markup-compatibility/2006" xmlns:a14="http://schemas.microsoft.com/office/drawing/2010/main">
-        <mc:Choice Requires="a14">
+      <mc:AlternateContent xmlns:mc="http://schemas.openxmlformats.org/markup-compatibility/2006">
+        <mc:Choice xmlns:a14="http://schemas.microsoft.com/office/drawing/2010/main" Requires="a14">
           <p:sp>
             <p:nvSpPr>
               <p:cNvPr id="234" name="TextBox 233"/>
@@ -3245,8 +3134,8 @@
             </p:nvSpPr>
             <p:spPr>
               <a:xfrm>
-                <a:off x="1880567" y="2895998"/>
-                <a:ext cx="261383" cy="239173"/>
+                <a:off x="1461717" y="2869910"/>
+                <a:ext cx="268727" cy="276999"/>
               </a:xfrm>
               <a:prstGeom prst="rect">
                 <a:avLst/>
@@ -3269,39 +3158,42 @@
                       <m:sSub>
                         <m:sSubPr>
                           <m:ctrlPr>
-                            <a:rPr lang="en-US" b="1" i="1" smtClean="0">
+                            <a:rPr lang="en-US" i="1" smtClean="0">
                               <a:latin typeface="Cambria Math" panose="02040503050406030204" pitchFamily="18" charset="0"/>
                             </a:rPr>
                           </m:ctrlPr>
                         </m:sSubPr>
                         <m:e>
                           <m:r>
-                            <a:rPr lang="en-US" b="1" i="0" smtClean="0">
+                            <m:rPr>
+                              <m:sty m:val="p"/>
+                            </m:rPr>
+                            <a:rPr lang="en-US" b="0" i="0" smtClean="0">
                               <a:latin typeface="Cambria Math" panose="02040503050406030204" pitchFamily="18" charset="0"/>
                             </a:rPr>
-                            <m:t>𝐒</m:t>
+                            <m:t>S</m:t>
                           </m:r>
                         </m:e>
                         <m:sub>
                           <m:r>
-                            <a:rPr lang="en-US" b="1" i="0" smtClean="0">
+                            <a:rPr lang="en-US" b="0" i="0" smtClean="0">
                               <a:latin typeface="Cambria Math" panose="02040503050406030204" pitchFamily="18" charset="0"/>
                             </a:rPr>
-                            <m:t>𝟏</m:t>
+                            <m:t>1</m:t>
                           </m:r>
                         </m:sub>
                       </m:sSub>
                     </m:oMath>
                   </m:oMathPara>
                 </a14:m>
-                <a:endParaRPr lang="en-US" b="1" dirty="0">
+                <a:endParaRPr lang="en-US" dirty="0">
                   <a:latin typeface="+mj-lt"/>
                 </a:endParaRPr>
               </a:p>
             </p:txBody>
           </p:sp>
         </mc:Choice>
-        <mc:Fallback xmlns="">
+        <mc:Fallback>
           <p:sp>
             <p:nvSpPr>
               <p:cNvPr id="234" name="TextBox 233"/>
@@ -3312,8 +3204,8 @@
             </p:nvSpPr>
             <p:spPr>
               <a:xfrm>
-                <a:off x="1880567" y="2895998"/>
-                <a:ext cx="261383" cy="239173"/>
+                <a:off x="1461717" y="2869910"/>
+                <a:ext cx="268727" cy="276999"/>
               </a:xfrm>
               <a:prstGeom prst="rect">
                 <a:avLst/>
@@ -3321,7 +3213,7 @@
               <a:blipFill>
                 <a:blip r:embed="rId2"/>
                 <a:stretch>
-                  <a:fillRect l="-25581" r="-13953" b="-35897"/>
+                  <a:fillRect l="-22727" r="-6818" b="-15556"/>
                 </a:stretch>
               </a:blipFill>
             </p:spPr>
@@ -3340,8 +3232,8 @@
           </p:sp>
         </mc:Fallback>
       </mc:AlternateContent>
-      <mc:AlternateContent xmlns:mc="http://schemas.openxmlformats.org/markup-compatibility/2006" xmlns:a14="http://schemas.microsoft.com/office/drawing/2010/main">
-        <mc:Choice Requires="a14">
+      <mc:AlternateContent xmlns:mc="http://schemas.openxmlformats.org/markup-compatibility/2006">
+        <mc:Choice xmlns:a14="http://schemas.microsoft.com/office/drawing/2010/main" Requires="a14">
           <p:sp>
             <p:nvSpPr>
               <p:cNvPr id="235" name="TextBox 234"/>
@@ -3350,8 +3242,8 @@
             </p:nvSpPr>
             <p:spPr>
               <a:xfrm>
-                <a:off x="4112805" y="2895998"/>
-                <a:ext cx="261383" cy="239173"/>
+                <a:off x="3271701" y="2869910"/>
+                <a:ext cx="274049" cy="276999"/>
               </a:xfrm>
               <a:prstGeom prst="rect">
                 <a:avLst/>
@@ -3374,39 +3266,42 @@
                       <m:sSub>
                         <m:sSubPr>
                           <m:ctrlPr>
-                            <a:rPr lang="en-US" b="1" i="1" smtClean="0">
+                            <a:rPr lang="en-US" i="1" smtClean="0">
                               <a:latin typeface="Cambria Math" panose="02040503050406030204" pitchFamily="18" charset="0"/>
                             </a:rPr>
                           </m:ctrlPr>
                         </m:sSubPr>
                         <m:e>
                           <m:r>
-                            <a:rPr lang="en-US" b="1" i="0" smtClean="0">
+                            <m:rPr>
+                              <m:sty m:val="p"/>
+                            </m:rPr>
+                            <a:rPr lang="en-US" b="0" i="0" smtClean="0">
                               <a:latin typeface="Cambria Math" panose="02040503050406030204" pitchFamily="18" charset="0"/>
                             </a:rPr>
-                            <m:t>𝐒</m:t>
+                            <m:t>S</m:t>
                           </m:r>
                         </m:e>
                         <m:sub>
                           <m:r>
-                            <a:rPr lang="en-US" b="1" i="0" smtClean="0">
+                            <a:rPr lang="en-US" b="0" i="0" smtClean="0">
                               <a:latin typeface="Cambria Math" panose="02040503050406030204" pitchFamily="18" charset="0"/>
                             </a:rPr>
-                            <m:t>𝟐</m:t>
+                            <m:t>2</m:t>
                           </m:r>
                         </m:sub>
                       </m:sSub>
                     </m:oMath>
                   </m:oMathPara>
                 </a14:m>
-                <a:endParaRPr lang="en-US" b="1" dirty="0">
+                <a:endParaRPr lang="en-US" dirty="0">
                   <a:latin typeface="+mj-lt"/>
                 </a:endParaRPr>
               </a:p>
             </p:txBody>
           </p:sp>
         </mc:Choice>
-        <mc:Fallback xmlns="">
+        <mc:Fallback>
           <p:sp>
             <p:nvSpPr>
               <p:cNvPr id="235" name="TextBox 234"/>
@@ -3417,8 +3312,8 @@
             </p:nvSpPr>
             <p:spPr>
               <a:xfrm>
-                <a:off x="4112805" y="2895998"/>
-                <a:ext cx="261383" cy="239173"/>
+                <a:off x="3271701" y="2869910"/>
+                <a:ext cx="274049" cy="276999"/>
               </a:xfrm>
               <a:prstGeom prst="rect">
                 <a:avLst/>
@@ -3426,7 +3321,7 @@
               <a:blipFill>
                 <a:blip r:embed="rId3"/>
                 <a:stretch>
-                  <a:fillRect l="-27907" r="-13953" b="-35897"/>
+                  <a:fillRect l="-22222" r="-6667" b="-15556"/>
                 </a:stretch>
               </a:blipFill>
             </p:spPr>
@@ -3445,8 +3340,8 @@
           </p:sp>
         </mc:Fallback>
       </mc:AlternateContent>
-      <mc:AlternateContent xmlns:mc="http://schemas.openxmlformats.org/markup-compatibility/2006" xmlns:a14="http://schemas.microsoft.com/office/drawing/2010/main">
-        <mc:Choice Requires="a14">
+      <mc:AlternateContent xmlns:mc="http://schemas.openxmlformats.org/markup-compatibility/2006">
+        <mc:Choice xmlns:a14="http://schemas.microsoft.com/office/drawing/2010/main" Requires="a14">
           <p:sp>
             <p:nvSpPr>
               <p:cNvPr id="236" name="TextBox 235"/>
@@ -3455,7 +3350,7 @@
             </p:nvSpPr>
             <p:spPr>
               <a:xfrm>
-                <a:off x="6361058" y="2877084"/>
+                <a:off x="5146044" y="2869910"/>
                 <a:ext cx="219436" cy="276999"/>
               </a:xfrm>
               <a:prstGeom prst="rect">
@@ -3479,39 +3374,42 @@
                       <m:sSub>
                         <m:sSubPr>
                           <m:ctrlPr>
-                            <a:rPr lang="en-US" b="1" i="1" smtClean="0">
+                            <a:rPr lang="en-US" i="1" smtClean="0">
                               <a:latin typeface="Cambria Math" panose="02040503050406030204" pitchFamily="18" charset="0"/>
                             </a:rPr>
                           </m:ctrlPr>
                         </m:sSubPr>
                         <m:e>
                           <m:r>
-                            <a:rPr lang="en-US" b="1" i="0" smtClean="0">
+                            <m:rPr>
+                              <m:sty m:val="p"/>
+                            </m:rPr>
+                            <a:rPr lang="en-US" b="0" i="0" smtClean="0">
                               <a:latin typeface="Cambria Math" panose="02040503050406030204" pitchFamily="18" charset="0"/>
                             </a:rPr>
-                            <m:t>𝐒</m:t>
+                            <m:t>S</m:t>
                           </m:r>
                         </m:e>
                         <m:sub>
                           <m:r>
-                            <a:rPr lang="en-US" b="1" i="0" smtClean="0">
+                            <a:rPr lang="en-US" b="0" i="0" smtClean="0">
                               <a:latin typeface="Cambria Math" panose="02040503050406030204" pitchFamily="18" charset="0"/>
                             </a:rPr>
-                            <m:t>𝟑</m:t>
+                            <m:t>3</m:t>
                           </m:r>
                         </m:sub>
                       </m:sSub>
                     </m:oMath>
                   </m:oMathPara>
                 </a14:m>
-                <a:endParaRPr lang="en-US" b="1" dirty="0">
+                <a:endParaRPr lang="en-US" dirty="0">
                   <a:latin typeface="+mj-lt"/>
                 </a:endParaRPr>
               </a:p>
             </p:txBody>
           </p:sp>
         </mc:Choice>
-        <mc:Fallback xmlns="">
+        <mc:Fallback>
           <p:sp>
             <p:nvSpPr>
               <p:cNvPr id="236" name="TextBox 235"/>
@@ -3522,7 +3420,7 @@
             </p:nvSpPr>
             <p:spPr>
               <a:xfrm>
-                <a:off x="6361058" y="2877084"/>
+                <a:off x="5146044" y="2869910"/>
                 <a:ext cx="219436" cy="276999"/>
               </a:xfrm>
               <a:prstGeom prst="rect">
@@ -3531,7 +3429,7 @@
               <a:blipFill>
                 <a:blip r:embed="rId4"/>
                 <a:stretch>
-                  <a:fillRect l="-36111" r="-30556" b="-17778"/>
+                  <a:fillRect l="-36111" r="-25000" b="-15556"/>
                 </a:stretch>
               </a:blipFill>
             </p:spPr>
@@ -3560,8 +3458,8 @@
             </p:nvSpPr>
             <p:spPr>
               <a:xfrm>
-                <a:off x="8345449" y="2910164"/>
-                <a:ext cx="261383" cy="239173"/>
+                <a:off x="6891979" y="2846365"/>
+                <a:ext cx="274049" cy="276999"/>
               </a:xfrm>
               <a:prstGeom prst="rect">
                 <a:avLst/>
@@ -3584,32 +3482,35 @@
                       <m:sSub>
                         <m:sSubPr>
                           <m:ctrlPr>
-                            <a:rPr lang="en-US" b="1" i="1" smtClean="0">
+                            <a:rPr lang="en-US" i="1" smtClean="0">
                               <a:latin typeface="Cambria Math" panose="02040503050406030204" pitchFamily="18" charset="0"/>
                             </a:rPr>
                           </m:ctrlPr>
                         </m:sSubPr>
                         <m:e>
                           <m:r>
-                            <a:rPr lang="en-US" b="1" i="0" smtClean="0">
+                            <m:rPr>
+                              <m:sty m:val="p"/>
+                            </m:rPr>
+                            <a:rPr lang="en-US" b="0" i="0" smtClean="0">
                               <a:latin typeface="Cambria Math" panose="02040503050406030204" pitchFamily="18" charset="0"/>
                             </a:rPr>
-                            <m:t>𝐒</m:t>
+                            <m:t>S</m:t>
                           </m:r>
                         </m:e>
                         <m:sub>
                           <m:r>
-                            <a:rPr lang="en-US" b="1" i="0" smtClean="0">
+                            <a:rPr lang="en-US" b="0" i="0" smtClean="0">
                               <a:latin typeface="Cambria Math" panose="02040503050406030204" pitchFamily="18" charset="0"/>
                             </a:rPr>
-                            <m:t>𝟒</m:t>
+                            <m:t>4</m:t>
                           </m:r>
                         </m:sub>
                       </m:sSub>
                     </m:oMath>
                   </m:oMathPara>
                 </a14:m>
-                <a:endParaRPr lang="en-US" b="1" dirty="0">
+                <a:endParaRPr lang="en-US" dirty="0">
                   <a:latin typeface="+mj-lt"/>
                 </a:endParaRPr>
               </a:p>
@@ -3627,8 +3528,8 @@
             </p:nvSpPr>
             <p:spPr>
               <a:xfrm>
-                <a:off x="8345449" y="2910164"/>
-                <a:ext cx="261383" cy="239173"/>
+                <a:off x="6891979" y="2846365"/>
+                <a:ext cx="274049" cy="276999"/>
               </a:xfrm>
               <a:prstGeom prst="rect">
                 <a:avLst/>
@@ -3636,7 +3537,7 @@
               <a:blipFill>
                 <a:blip r:embed="rId5"/>
                 <a:stretch>
-                  <a:fillRect l="-25581" r="-13953" b="-32500"/>
+                  <a:fillRect l="-22222" r="-6667" b="-15556"/>
                 </a:stretch>
               </a:blipFill>
             </p:spPr>
@@ -3655,66 +3556,19 @@
           </p:sp>
         </mc:Fallback>
       </mc:AlternateContent>
-      <p:sp>
-        <p:nvSpPr>
-          <p:cNvPr id="34" name="Rounded Rectangle 33"/>
-          <p:cNvSpPr/>
-          <p:nvPr/>
-        </p:nvSpPr>
-        <p:spPr>
-          <a:xfrm>
-            <a:off x="4518385" y="1328907"/>
-            <a:ext cx="1661387" cy="1003495"/>
-          </a:xfrm>
-          <a:prstGeom prst="roundRect">
-            <a:avLst/>
-          </a:prstGeom>
-          <a:ln w="19050"/>
-        </p:spPr>
-        <p:style>
-          <a:lnRef idx="2">
-            <a:schemeClr val="dk1"/>
-          </a:lnRef>
-          <a:fillRef idx="1">
-            <a:schemeClr val="lt1"/>
-          </a:fillRef>
-          <a:effectRef idx="0">
-            <a:schemeClr val="dk1"/>
-          </a:effectRef>
-          <a:fontRef idx="minor">
-            <a:schemeClr val="dk1"/>
-          </a:fontRef>
-        </p:style>
-        <p:txBody>
-          <a:bodyPr rtlCol="0" anchor="ctr"/>
-          <a:lstStyle/>
-          <a:p>
-            <a:pPr algn="ctr"/>
-            <a:r>
-              <a:rPr lang="en-US" b="1" dirty="0" smtClean="0">
-                <a:latin typeface="+mj-lt"/>
-              </a:rPr>
-              <a:t>Sink</a:t>
-            </a:r>
-            <a:endParaRPr lang="en-US" b="1" dirty="0">
-              <a:latin typeface="+mj-lt"/>
-            </a:endParaRPr>
-          </a:p>
-        </p:txBody>
-      </p:sp>
       <p:cxnSp>
         <p:nvCxnSpPr>
           <p:cNvPr id="4" name="Elbow Connector 3"/>
           <p:cNvCxnSpPr>
-            <a:stCxn id="177" idx="0"/>
-            <a:endCxn id="34" idx="1"/>
+            <a:stCxn id="53" idx="0"/>
+            <a:endCxn id="66" idx="1"/>
           </p:cNvCxnSpPr>
           <p:nvPr/>
         </p:nvCxnSpPr>
         <p:spPr>
           <a:xfrm rot="5400000" flipH="1" flipV="1">
-            <a:off x="3369890" y="1585827"/>
-            <a:ext cx="903667" cy="1393324"/>
+            <a:off x="2755270" y="1791996"/>
+            <a:ext cx="683337" cy="1201319"/>
           </a:xfrm>
           <a:prstGeom prst="bentConnector2">
             <a:avLst/>
@@ -3738,8 +3592,8 @@
           </a:fontRef>
         </p:style>
       </p:cxnSp>
-      <mc:AlternateContent xmlns:mc="http://schemas.openxmlformats.org/markup-compatibility/2006" xmlns:a14="http://schemas.microsoft.com/office/drawing/2010/main">
-        <mc:Choice Requires="a14">
+      <mc:AlternateContent xmlns:mc="http://schemas.openxmlformats.org/markup-compatibility/2006">
+        <mc:Choice xmlns:a14="http://schemas.microsoft.com/office/drawing/2010/main" Requires="a14">
           <p:sp>
             <p:nvSpPr>
               <p:cNvPr id="5" name="Rectangle 4"/>
@@ -3748,15 +3602,15 @@
             </p:nvSpPr>
             <p:spPr>
               <a:xfrm>
-                <a:off x="3967910" y="1804899"/>
-                <a:ext cx="572529" cy="369332"/>
+                <a:off x="3165498" y="1681654"/>
+                <a:ext cx="456972" cy="369332"/>
               </a:xfrm>
               <a:prstGeom prst="rect">
                 <a:avLst/>
               </a:prstGeom>
             </p:spPr>
             <p:txBody>
-              <a:bodyPr wrap="none">
+              <a:bodyPr wrap="square">
                 <a:spAutoFit/>
               </a:bodyPr>
               <a:lstStyle/>
@@ -3771,25 +3625,37 @@
                       <m:sSub>
                         <m:sSubPr>
                           <m:ctrlPr>
-                            <a:rPr lang="en-US" b="1" i="1" smtClean="0">
+                            <a:rPr lang="en-US" i="1" smtClean="0">
                               <a:latin typeface="Cambria Math" panose="02040503050406030204" pitchFamily="18" charset="0"/>
                             </a:rPr>
                           </m:ctrlPr>
                         </m:sSubPr>
                         <m:e>
                           <m:r>
-                            <a:rPr lang="en-US" b="1">
+                            <m:rPr>
+                              <m:sty m:val="p"/>
+                            </m:rPr>
+                            <a:rPr lang="en-US" b="0" i="1">
                               <a:latin typeface="Cambria Math" panose="02040503050406030204" pitchFamily="18" charset="0"/>
                             </a:rPr>
-                            <m:t>𝐒</m:t>
+                            <m:t>S</m:t>
                           </m:r>
                         </m:e>
                         <m:sub>
                           <m:r>
-                            <a:rPr lang="en-US" b="1" i="0" smtClean="0">
+                            <a:rPr lang="en-US" b="0" i="0" smtClean="0">
                               <a:latin typeface="Cambria Math" panose="02040503050406030204" pitchFamily="18" charset="0"/>
                             </a:rPr>
-                            <m:t>𝟐𝐛</m:t>
+                            <m:t>2</m:t>
+                          </m:r>
+                          <m:r>
+                            <m:rPr>
+                              <m:sty m:val="p"/>
+                            </m:rPr>
+                            <a:rPr lang="en-US" b="0" i="0" smtClean="0">
+                              <a:latin typeface="Cambria Math" panose="02040503050406030204" pitchFamily="18" charset="0"/>
+                            </a:rPr>
+                            <m:t>b</m:t>
                           </m:r>
                         </m:sub>
                       </m:sSub>
@@ -3801,7 +3667,7 @@
             </p:txBody>
           </p:sp>
         </mc:Choice>
-        <mc:Fallback xmlns="">
+        <mc:Fallback>
           <p:sp>
             <p:nvSpPr>
               <p:cNvPr id="5" name="Rectangle 4"/>
@@ -3812,8 +3678,8 @@
             </p:nvSpPr>
             <p:spPr>
               <a:xfrm>
-                <a:off x="3967910" y="1804899"/>
-                <a:ext cx="572529" cy="369332"/>
+                <a:off x="3165498" y="1681654"/>
+                <a:ext cx="456972" cy="369332"/>
               </a:xfrm>
               <a:prstGeom prst="rect">
                 <a:avLst/>
@@ -3821,7 +3687,7 @@
               <a:blipFill>
                 <a:blip r:embed="rId6"/>
                 <a:stretch>
-                  <a:fillRect/>
+                  <a:fillRect r="-4000" b="-1667"/>
                 </a:stretch>
               </a:blipFill>
             </p:spPr>
@@ -3848,7 +3714,7 @@
         </p:nvSpPr>
         <p:spPr>
           <a:xfrm>
-            <a:off x="1428427" y="2721974"/>
+            <a:off x="976136" y="2728857"/>
             <a:ext cx="395040" cy="307777"/>
           </a:xfrm>
           <a:prstGeom prst="rect">
@@ -3863,206 +3729,22 @@
           <a:lstStyle/>
           <a:p>
             <a:r>
-              <a:rPr lang="en-US" sz="1400" b="1" dirty="0" smtClean="0"/>
+              <a:rPr lang="en-US" sz="1400" dirty="0" smtClean="0"/>
               <a:t>B1</a:t>
             </a:r>
-            <a:endParaRPr lang="en-US" sz="1400" b="1" dirty="0"/>
-          </a:p>
-        </p:txBody>
-      </p:sp>
-      <p:sp>
-        <p:nvSpPr>
-          <p:cNvPr id="58" name="TextBox 57"/>
-          <p:cNvSpPr txBox="1"/>
-          <p:nvPr/>
-        </p:nvSpPr>
-        <p:spPr>
-          <a:xfrm>
-            <a:off x="5848843" y="1303764"/>
-            <a:ext cx="377026" cy="307777"/>
-          </a:xfrm>
-          <a:prstGeom prst="rect">
-            <a:avLst/>
-          </a:prstGeom>
-          <a:noFill/>
-        </p:spPr>
-        <p:txBody>
-          <a:bodyPr wrap="none" rtlCol="0">
-            <a:spAutoFit/>
-          </a:bodyPr>
-          <a:lstStyle/>
-          <a:p>
-            <a:r>
-              <a:rPr lang="en-US" sz="1400" b="1" dirty="0" smtClean="0"/>
-              <a:t>B3</a:t>
-            </a:r>
-            <a:endParaRPr lang="en-US" sz="1400" b="1" dirty="0"/>
-          </a:p>
-        </p:txBody>
-      </p:sp>
-      <p:sp>
-        <p:nvSpPr>
-          <p:cNvPr id="60" name="TextBox 59"/>
-          <p:cNvSpPr txBox="1"/>
-          <p:nvPr/>
-        </p:nvSpPr>
-        <p:spPr>
-          <a:xfrm>
-            <a:off x="3646400" y="2721975"/>
-            <a:ext cx="395040" cy="307777"/>
-          </a:xfrm>
-          <a:prstGeom prst="rect">
-            <a:avLst/>
-          </a:prstGeom>
-          <a:noFill/>
-        </p:spPr>
-        <p:txBody>
-          <a:bodyPr wrap="square" rtlCol="0">
-            <a:spAutoFit/>
-          </a:bodyPr>
-          <a:lstStyle/>
-          <a:p>
-            <a:r>
-              <a:rPr lang="en-US" sz="1400" b="1" dirty="0" smtClean="0"/>
-              <a:t>B2</a:t>
-            </a:r>
-            <a:endParaRPr lang="en-US" sz="1400" b="1" dirty="0"/>
-          </a:p>
-        </p:txBody>
-      </p:sp>
-      <p:sp>
-        <p:nvSpPr>
-          <p:cNvPr id="61" name="TextBox 60"/>
-          <p:cNvSpPr txBox="1"/>
-          <p:nvPr/>
-        </p:nvSpPr>
-        <p:spPr>
-          <a:xfrm>
-            <a:off x="5851818" y="2721974"/>
-            <a:ext cx="395040" cy="307777"/>
-          </a:xfrm>
-          <a:prstGeom prst="rect">
-            <a:avLst/>
-          </a:prstGeom>
-          <a:noFill/>
-        </p:spPr>
-        <p:txBody>
-          <a:bodyPr wrap="square" rtlCol="0">
-            <a:spAutoFit/>
-          </a:bodyPr>
-          <a:lstStyle/>
-          <a:p>
-            <a:r>
-              <a:rPr lang="en-US" sz="1400" b="1" dirty="0" smtClean="0"/>
-              <a:t>B4</a:t>
-            </a:r>
-            <a:endParaRPr lang="en-US" sz="1400" b="1" dirty="0"/>
-          </a:p>
-        </p:txBody>
-      </p:sp>
-      <p:sp>
-        <p:nvSpPr>
-          <p:cNvPr id="38" name="Rounded Rectangle 37"/>
-          <p:cNvSpPr/>
-          <p:nvPr/>
-        </p:nvSpPr>
-        <p:spPr>
-          <a:xfrm>
-            <a:off x="6747013" y="2721974"/>
-            <a:ext cx="1485845" cy="1015843"/>
-          </a:xfrm>
-          <a:prstGeom prst="roundRect">
-            <a:avLst/>
-          </a:prstGeom>
-          <a:ln w="19050"/>
-        </p:spPr>
-        <p:style>
-          <a:lnRef idx="2">
-            <a:schemeClr val="dk1"/>
-          </a:lnRef>
-          <a:fillRef idx="1">
-            <a:schemeClr val="lt1"/>
-          </a:fillRef>
-          <a:effectRef idx="0">
-            <a:schemeClr val="dk1"/>
-          </a:effectRef>
-          <a:fontRef idx="minor">
-            <a:schemeClr val="dk1"/>
-          </a:fontRef>
-        </p:style>
-        <p:txBody>
-          <a:bodyPr rtlCol="0" anchor="ctr"/>
-          <a:lstStyle/>
-          <a:p>
-            <a:pPr algn="ctr"/>
-            <a:r>
-              <a:rPr lang="en-US" b="1" dirty="0" smtClean="0">
-                <a:latin typeface="+mj-lt"/>
-              </a:rPr>
-              <a:t>Pulse Shaper</a:t>
-            </a:r>
-            <a:endParaRPr lang="en-US" b="1" dirty="0">
-              <a:latin typeface="+mj-lt"/>
-            </a:endParaRPr>
-          </a:p>
-        </p:txBody>
-      </p:sp>
-      <p:sp>
-        <p:nvSpPr>
-          <p:cNvPr id="39" name="Rounded Rectangle 38"/>
-          <p:cNvSpPr/>
-          <p:nvPr/>
-        </p:nvSpPr>
-        <p:spPr>
-          <a:xfrm>
-            <a:off x="8733013" y="2721975"/>
-            <a:ext cx="1465087" cy="1009667"/>
-          </a:xfrm>
-          <a:prstGeom prst="roundRect">
-            <a:avLst/>
-          </a:prstGeom>
-          <a:ln w="19050"/>
-        </p:spPr>
-        <p:style>
-          <a:lnRef idx="2">
-            <a:schemeClr val="dk1"/>
-          </a:lnRef>
-          <a:fillRef idx="1">
-            <a:schemeClr val="lt1"/>
-          </a:fillRef>
-          <a:effectRef idx="0">
-            <a:schemeClr val="dk1"/>
-          </a:effectRef>
-          <a:fontRef idx="minor">
-            <a:schemeClr val="dk1"/>
-          </a:fontRef>
-        </p:style>
-        <p:txBody>
-          <a:bodyPr rtlCol="0" anchor="ctr"/>
-          <a:lstStyle/>
-          <a:p>
-            <a:pPr algn="ctr"/>
-            <a:r>
-              <a:rPr lang="en-US" b="1" dirty="0" smtClean="0">
-                <a:latin typeface="+mj-lt"/>
-              </a:rPr>
-              <a:t>Hilbert Transformer</a:t>
-            </a:r>
+            <a:endParaRPr lang="en-US" sz="1400" dirty="0"/>
           </a:p>
         </p:txBody>
       </p:sp>
       <p:cxnSp>
         <p:nvCxnSpPr>
           <p:cNvPr id="40" name="Straight Arrow Connector 39"/>
-          <p:cNvCxnSpPr>
-            <a:stCxn id="38" idx="3"/>
-            <a:endCxn id="39" idx="1"/>
-          </p:cNvCxnSpPr>
+          <p:cNvCxnSpPr/>
           <p:nvPr/>
         </p:nvCxnSpPr>
         <p:spPr>
           <a:xfrm flipV="1">
-            <a:off x="8232858" y="3226809"/>
+            <a:off x="6775555" y="3146909"/>
             <a:ext cx="500155" cy="3087"/>
           </a:xfrm>
           <a:prstGeom prst="straightConnector1">
@@ -4087,63 +3769,16 @@
           </a:fontRef>
         </p:style>
       </p:cxnSp>
-      <p:sp>
-        <p:nvSpPr>
-          <p:cNvPr id="54" name="Rounded Rectangle 53"/>
-          <p:cNvSpPr/>
-          <p:nvPr/>
-        </p:nvSpPr>
-        <p:spPr>
-          <a:xfrm>
-            <a:off x="10683325" y="2728147"/>
-            <a:ext cx="1474201" cy="1003495"/>
-          </a:xfrm>
-          <a:prstGeom prst="roundRect">
-            <a:avLst/>
-          </a:prstGeom>
-          <a:ln w="19050"/>
-        </p:spPr>
-        <p:style>
-          <a:lnRef idx="2">
-            <a:schemeClr val="dk1"/>
-          </a:lnRef>
-          <a:fillRef idx="1">
-            <a:schemeClr val="lt1"/>
-          </a:fillRef>
-          <a:effectRef idx="0">
-            <a:schemeClr val="dk1"/>
-          </a:effectRef>
-          <a:fontRef idx="minor">
-            <a:schemeClr val="dk1"/>
-          </a:fontRef>
-        </p:style>
-        <p:txBody>
-          <a:bodyPr rtlCol="0" anchor="ctr"/>
-          <a:lstStyle/>
-          <a:p>
-            <a:pPr algn="ctr"/>
-            <a:r>
-              <a:rPr lang="en-US" b="1" dirty="0" smtClean="0">
-                <a:latin typeface="+mj-lt"/>
-              </a:rPr>
-              <a:t>Sink</a:t>
-            </a:r>
-          </a:p>
-        </p:txBody>
-      </p:sp>
       <p:cxnSp>
         <p:nvCxnSpPr>
           <p:cNvPr id="59" name="Straight Arrow Connector 58"/>
-          <p:cNvCxnSpPr>
-            <a:stCxn id="39" idx="3"/>
-            <a:endCxn id="54" idx="1"/>
-          </p:cNvCxnSpPr>
+          <p:cNvCxnSpPr/>
           <p:nvPr/>
         </p:nvCxnSpPr>
         <p:spPr>
           <a:xfrm>
-            <a:off x="10198100" y="3226809"/>
-            <a:ext cx="485225" cy="3086"/>
+            <a:off x="8525606" y="3008409"/>
+            <a:ext cx="2240720" cy="0"/>
           </a:xfrm>
           <a:prstGeom prst="straightConnector1">
             <a:avLst/>
@@ -4177,7 +3812,7 @@
             </p:nvSpPr>
             <p:spPr>
               <a:xfrm>
-                <a:off x="10306253" y="2915847"/>
+                <a:off x="8591177" y="2676804"/>
                 <a:ext cx="283667" cy="276999"/>
               </a:xfrm>
               <a:prstGeom prst="rect">
@@ -4201,32 +3836,35 @@
                       <m:sSub>
                         <m:sSubPr>
                           <m:ctrlPr>
-                            <a:rPr lang="en-US" b="1" i="1" smtClean="0">
+                            <a:rPr lang="en-US" i="1" smtClean="0">
                               <a:latin typeface="Cambria Math" panose="02040503050406030204" pitchFamily="18" charset="0"/>
                             </a:rPr>
                           </m:ctrlPr>
                         </m:sSubPr>
                         <m:e>
                           <m:r>
-                            <a:rPr lang="en-US" b="1" i="0" smtClean="0">
+                            <m:rPr>
+                              <m:sty m:val="p"/>
+                            </m:rPr>
+                            <a:rPr lang="en-US" b="0" i="0" smtClean="0">
                               <a:latin typeface="Cambria Math" panose="02040503050406030204" pitchFamily="18" charset="0"/>
                             </a:rPr>
-                            <m:t>𝐒</m:t>
+                            <m:t>S</m:t>
                           </m:r>
                         </m:e>
                         <m:sub>
                           <m:r>
-                            <a:rPr lang="en-US" b="1" i="1" smtClean="0">
+                            <a:rPr lang="en-US" b="0" i="1" smtClean="0">
                               <a:latin typeface="Cambria Math" panose="02040503050406030204" pitchFamily="18" charset="0"/>
                             </a:rPr>
-                            <m:t>𝟓</m:t>
+                            <m:t>5</m:t>
                           </m:r>
                         </m:sub>
                       </m:sSub>
                     </m:oMath>
                   </m:oMathPara>
                 </a14:m>
-                <a:endParaRPr lang="en-US" b="1" dirty="0">
+                <a:endParaRPr lang="en-US" dirty="0">
                   <a:latin typeface="+mj-lt"/>
                 </a:endParaRPr>
               </a:p>
@@ -4244,7 +3882,7 @@
             </p:nvSpPr>
             <p:spPr>
               <a:xfrm>
-                <a:off x="10306253" y="2915847"/>
+                <a:off x="8591177" y="2676804"/>
                 <a:ext cx="283667" cy="276999"/>
               </a:xfrm>
               <a:prstGeom prst="rect">
@@ -4253,7 +3891,7 @@
               <a:blipFill>
                 <a:blip r:embed="rId7"/>
                 <a:stretch>
-                  <a:fillRect l="-21739" r="-10870" b="-17391"/>
+                  <a:fillRect l="-17021" r="-6383" b="-15217"/>
                 </a:stretch>
               </a:blipFill>
             </p:spPr>
@@ -4272,110 +3910,21 @@
           </p:sp>
         </mc:Fallback>
       </mc:AlternateContent>
-      <p:sp>
-        <p:nvSpPr>
-          <p:cNvPr id="62" name="TextBox 61"/>
-          <p:cNvSpPr txBox="1"/>
-          <p:nvPr/>
-        </p:nvSpPr>
-        <p:spPr>
-          <a:xfrm>
-            <a:off x="7890375" y="2728147"/>
-            <a:ext cx="395040" cy="307777"/>
-          </a:xfrm>
-          <a:prstGeom prst="rect">
-            <a:avLst/>
-          </a:prstGeom>
-          <a:noFill/>
-        </p:spPr>
-        <p:txBody>
-          <a:bodyPr wrap="square" rtlCol="0">
-            <a:spAutoFit/>
-          </a:bodyPr>
-          <a:lstStyle/>
-          <a:p>
-            <a:r>
-              <a:rPr lang="en-US" sz="1400" b="1" dirty="0" smtClean="0"/>
-              <a:t>B5</a:t>
-            </a:r>
-            <a:endParaRPr lang="en-US" sz="1400" b="1" dirty="0"/>
-          </a:p>
-        </p:txBody>
-      </p:sp>
-      <p:sp>
-        <p:nvSpPr>
-          <p:cNvPr id="64" name="TextBox 63"/>
-          <p:cNvSpPr txBox="1"/>
-          <p:nvPr/>
-        </p:nvSpPr>
-        <p:spPr>
-          <a:xfrm>
-            <a:off x="9817808" y="2707806"/>
-            <a:ext cx="395040" cy="307777"/>
-          </a:xfrm>
-          <a:prstGeom prst="rect">
-            <a:avLst/>
-          </a:prstGeom>
-          <a:noFill/>
-        </p:spPr>
-        <p:txBody>
-          <a:bodyPr wrap="square" rtlCol="0">
-            <a:spAutoFit/>
-          </a:bodyPr>
-          <a:lstStyle/>
-          <a:p>
-            <a:r>
-              <a:rPr lang="en-US" sz="1400" b="1" dirty="0" smtClean="0"/>
-              <a:t>B6</a:t>
-            </a:r>
-            <a:endParaRPr lang="en-US" sz="1400" b="1" dirty="0"/>
-          </a:p>
-        </p:txBody>
-      </p:sp>
-      <p:sp>
-        <p:nvSpPr>
-          <p:cNvPr id="65" name="TextBox 64"/>
-          <p:cNvSpPr txBox="1"/>
-          <p:nvPr/>
-        </p:nvSpPr>
-        <p:spPr>
-          <a:xfrm>
-            <a:off x="11782742" y="2728857"/>
-            <a:ext cx="395040" cy="307777"/>
-          </a:xfrm>
-          <a:prstGeom prst="rect">
-            <a:avLst/>
-          </a:prstGeom>
-          <a:noFill/>
-        </p:spPr>
-        <p:txBody>
-          <a:bodyPr wrap="square" rtlCol="0">
-            <a:spAutoFit/>
-          </a:bodyPr>
-          <a:lstStyle/>
-          <a:p>
-            <a:r>
-              <a:rPr lang="en-US" sz="1400" b="1" dirty="0" smtClean="0"/>
-              <a:t>B7</a:t>
-            </a:r>
-            <a:endParaRPr lang="en-US" sz="1400" b="1" dirty="0"/>
-          </a:p>
-        </p:txBody>
-      </p:sp>
       <p:cxnSp>
         <p:nvCxnSpPr>
-          <p:cNvPr id="29" name="Curved Connector 28"/>
+          <p:cNvPr id="42" name="Straight Arrow Connector 41"/>
           <p:cNvCxnSpPr>
-            <a:endCxn id="63" idx="0"/>
+            <a:stCxn id="87" idx="3"/>
+            <a:endCxn id="85" idx="1"/>
           </p:cNvCxnSpPr>
           <p:nvPr/>
         </p:nvCxnSpPr>
         <p:spPr>
           <a:xfrm>
-            <a:off x="9169400" y="1804899"/>
-            <a:ext cx="1278687" cy="1110948"/>
+            <a:off x="10088903" y="4666660"/>
+            <a:ext cx="677423" cy="0"/>
           </a:xfrm>
-          <a:prstGeom prst="curvedConnector2">
+          <a:prstGeom prst="straightConnector1">
             <a:avLst/>
           </a:prstGeom>
           <a:ln w="19050">
@@ -4399,14 +3948,14 @@
       </p:cxnSp>
       <p:sp>
         <p:nvSpPr>
-          <p:cNvPr id="32" name="TextBox 31"/>
+          <p:cNvPr id="44" name="TextBox 43"/>
           <p:cNvSpPr txBox="1"/>
           <p:nvPr/>
         </p:nvSpPr>
         <p:spPr>
           <a:xfrm>
-            <a:off x="7511954" y="1582996"/>
-            <a:ext cx="1645515" cy="369332"/>
+            <a:off x="9817808" y="4227215"/>
+            <a:ext cx="395040" cy="307777"/>
           </a:xfrm>
           <a:prstGeom prst="rect">
             <a:avLst/>
@@ -4414,20 +3963,884 @@
           <a:noFill/>
         </p:spPr>
         <p:txBody>
+          <a:bodyPr wrap="square" rtlCol="0">
+            <a:spAutoFit/>
+          </a:bodyPr>
+          <a:lstStyle/>
+          <a:p>
+            <a:r>
+              <a:rPr lang="en-US" sz="1400" dirty="0" smtClean="0"/>
+              <a:t>B8</a:t>
+            </a:r>
+            <a:endParaRPr lang="en-US" sz="1400" dirty="0"/>
+          </a:p>
+        </p:txBody>
+      </p:sp>
+      <p:sp>
+        <p:nvSpPr>
+          <p:cNvPr id="53" name="Rounded Rectangle 52"/>
+          <p:cNvSpPr/>
+          <p:nvPr/>
+        </p:nvSpPr>
+        <p:spPr>
+          <a:xfrm>
+            <a:off x="1871331" y="2734323"/>
+            <a:ext cx="1249896" cy="878890"/>
+          </a:xfrm>
+          <a:prstGeom prst="roundRect">
+            <a:avLst/>
+          </a:prstGeom>
+          <a:ln w="19050"/>
+        </p:spPr>
+        <p:style>
+          <a:lnRef idx="2">
+            <a:schemeClr val="dk1"/>
+          </a:lnRef>
+          <a:fillRef idx="1">
+            <a:schemeClr val="lt1"/>
+          </a:fillRef>
+          <a:effectRef idx="0">
+            <a:schemeClr val="dk1"/>
+          </a:effectRef>
+          <a:fontRef idx="minor">
+            <a:schemeClr val="dk1"/>
+          </a:fontRef>
+        </p:style>
+        <p:txBody>
+          <a:bodyPr rtlCol="0" anchor="ctr"/>
+          <a:lstStyle/>
+          <a:p>
+            <a:pPr algn="ctr"/>
+            <a:r>
+              <a:rPr lang="en-US" dirty="0" smtClean="0">
+                <a:latin typeface="+mj-lt"/>
+              </a:rPr>
+              <a:t>MPAM</a:t>
+            </a:r>
+          </a:p>
+          <a:p>
+            <a:pPr algn="ctr"/>
+            <a:r>
+              <a:rPr lang="en-US" dirty="0" smtClean="0">
+                <a:latin typeface="+mj-lt"/>
+              </a:rPr>
+              <a:t>Mapping</a:t>
+            </a:r>
+            <a:endParaRPr lang="en-US" dirty="0">
+              <a:latin typeface="+mj-lt"/>
+            </a:endParaRPr>
+          </a:p>
+        </p:txBody>
+      </p:sp>
+      <p:sp>
+        <p:nvSpPr>
+          <p:cNvPr id="66" name="Rounded Rectangle 65"/>
+          <p:cNvSpPr/>
+          <p:nvPr/>
+        </p:nvSpPr>
+        <p:spPr>
+          <a:xfrm>
+            <a:off x="3697598" y="1611541"/>
+            <a:ext cx="1249896" cy="878890"/>
+          </a:xfrm>
+          <a:prstGeom prst="roundRect">
+            <a:avLst/>
+          </a:prstGeom>
+          <a:ln w="19050"/>
+        </p:spPr>
+        <p:style>
+          <a:lnRef idx="2">
+            <a:schemeClr val="dk1"/>
+          </a:lnRef>
+          <a:fillRef idx="1">
+            <a:schemeClr val="lt1"/>
+          </a:fillRef>
+          <a:effectRef idx="0">
+            <a:schemeClr val="dk1"/>
+          </a:effectRef>
+          <a:fontRef idx="minor">
+            <a:schemeClr val="dk1"/>
+          </a:fontRef>
+        </p:style>
+        <p:txBody>
+          <a:bodyPr rtlCol="0" anchor="ctr"/>
+          <a:lstStyle/>
+          <a:p>
+            <a:pPr algn="ctr"/>
+            <a:r>
+              <a:rPr lang="en-US" dirty="0" smtClean="0">
+                <a:latin typeface="+mj-lt"/>
+              </a:rPr>
+              <a:t>Sink</a:t>
+            </a:r>
+          </a:p>
+        </p:txBody>
+      </p:sp>
+      <p:sp>
+        <p:nvSpPr>
+          <p:cNvPr id="67" name="Rounded Rectangle 66"/>
+          <p:cNvSpPr/>
+          <p:nvPr/>
+        </p:nvSpPr>
+        <p:spPr>
+          <a:xfrm>
+            <a:off x="3666741" y="2734323"/>
+            <a:ext cx="1311610" cy="878890"/>
+          </a:xfrm>
+          <a:prstGeom prst="roundRect">
+            <a:avLst/>
+          </a:prstGeom>
+          <a:ln w="19050"/>
+        </p:spPr>
+        <p:style>
+          <a:lnRef idx="2">
+            <a:schemeClr val="dk1"/>
+          </a:lnRef>
+          <a:fillRef idx="1">
+            <a:schemeClr val="lt1"/>
+          </a:fillRef>
+          <a:effectRef idx="0">
+            <a:schemeClr val="dk1"/>
+          </a:effectRef>
+          <a:fontRef idx="minor">
+            <a:schemeClr val="dk1"/>
+          </a:fontRef>
+        </p:style>
+        <p:txBody>
+          <a:bodyPr rtlCol="0" anchor="ctr"/>
+          <a:lstStyle/>
+          <a:p>
+            <a:pPr algn="ctr"/>
+            <a:r>
+              <a:rPr lang="en-US" sz="1400" dirty="0" smtClean="0">
+                <a:latin typeface="+mj-lt"/>
+              </a:rPr>
+              <a:t>Discrete to Continuous Time</a:t>
+            </a:r>
+          </a:p>
+        </p:txBody>
+      </p:sp>
+      <p:sp>
+        <p:nvSpPr>
+          <p:cNvPr id="60" name="TextBox 59"/>
+          <p:cNvSpPr txBox="1"/>
+          <p:nvPr/>
+        </p:nvSpPr>
+        <p:spPr>
+          <a:xfrm>
+            <a:off x="2786221" y="2728857"/>
+            <a:ext cx="395040" cy="307777"/>
+          </a:xfrm>
+          <a:prstGeom prst="rect">
+            <a:avLst/>
+          </a:prstGeom>
+          <a:noFill/>
+        </p:spPr>
+        <p:txBody>
+          <a:bodyPr wrap="square" rtlCol="0">
+            <a:spAutoFit/>
+          </a:bodyPr>
+          <a:lstStyle/>
+          <a:p>
+            <a:r>
+              <a:rPr lang="en-US" sz="1400" dirty="0" smtClean="0"/>
+              <a:t>B2</a:t>
+            </a:r>
+            <a:endParaRPr lang="en-US" sz="1400" dirty="0"/>
+          </a:p>
+        </p:txBody>
+      </p:sp>
+      <p:sp>
+        <p:nvSpPr>
+          <p:cNvPr id="58" name="TextBox 57"/>
+          <p:cNvSpPr txBox="1"/>
+          <p:nvPr/>
+        </p:nvSpPr>
+        <p:spPr>
+          <a:xfrm>
+            <a:off x="4601325" y="1619697"/>
+            <a:ext cx="377026" cy="307777"/>
+          </a:xfrm>
+          <a:prstGeom prst="rect">
+            <a:avLst/>
+          </a:prstGeom>
+          <a:noFill/>
+        </p:spPr>
+        <p:txBody>
           <a:bodyPr wrap="none" rtlCol="0">
             <a:spAutoFit/>
           </a:bodyPr>
           <a:lstStyle/>
           <a:p>
             <a:r>
-              <a:rPr lang="en-US" b="1" dirty="0" smtClean="0">
+              <a:rPr lang="en-US" sz="1400" dirty="0" smtClean="0"/>
+              <a:t>B3</a:t>
+            </a:r>
+            <a:endParaRPr lang="en-US" sz="1400" dirty="0"/>
+          </a:p>
+        </p:txBody>
+      </p:sp>
+      <p:sp>
+        <p:nvSpPr>
+          <p:cNvPr id="61" name="TextBox 60"/>
+          <p:cNvSpPr txBox="1"/>
+          <p:nvPr/>
+        </p:nvSpPr>
+        <p:spPr>
+          <a:xfrm>
+            <a:off x="4637388" y="2728857"/>
+            <a:ext cx="395040" cy="307777"/>
+          </a:xfrm>
+          <a:prstGeom prst="rect">
+            <a:avLst/>
+          </a:prstGeom>
+          <a:noFill/>
+        </p:spPr>
+        <p:txBody>
+          <a:bodyPr wrap="square" rtlCol="0">
+            <a:spAutoFit/>
+          </a:bodyPr>
+          <a:lstStyle/>
+          <a:p>
+            <a:r>
+              <a:rPr lang="en-US" sz="1400" dirty="0" smtClean="0"/>
+              <a:t>B4</a:t>
+            </a:r>
+            <a:endParaRPr lang="en-US" sz="1400" dirty="0"/>
+          </a:p>
+        </p:txBody>
+      </p:sp>
+      <p:sp>
+        <p:nvSpPr>
+          <p:cNvPr id="69" name="Rounded Rectangle 68"/>
+          <p:cNvSpPr/>
+          <p:nvPr/>
+        </p:nvSpPr>
+        <p:spPr>
+          <a:xfrm>
+            <a:off x="5525659" y="2734323"/>
+            <a:ext cx="1249896" cy="878890"/>
+          </a:xfrm>
+          <a:prstGeom prst="roundRect">
+            <a:avLst/>
+          </a:prstGeom>
+          <a:ln w="19050"/>
+        </p:spPr>
+        <p:style>
+          <a:lnRef idx="2">
+            <a:schemeClr val="dk1"/>
+          </a:lnRef>
+          <a:fillRef idx="1">
+            <a:schemeClr val="lt1"/>
+          </a:fillRef>
+          <a:effectRef idx="0">
+            <a:schemeClr val="dk1"/>
+          </a:effectRef>
+          <a:fontRef idx="minor">
+            <a:schemeClr val="dk1"/>
+          </a:fontRef>
+        </p:style>
+        <p:txBody>
+          <a:bodyPr rtlCol="0" anchor="ctr"/>
+          <a:lstStyle/>
+          <a:p>
+            <a:pPr algn="ctr"/>
+            <a:r>
+              <a:rPr lang="en-US" dirty="0" smtClean="0">
                 <a:latin typeface="+mj-lt"/>
               </a:rPr>
-              <a:t>Analytical Signal</a:t>
-            </a:r>
-            <a:endParaRPr lang="en-US" b="1" dirty="0">
-              <a:latin typeface="+mj-lt"/>
-            </a:endParaRPr>
+              <a:t>Pulse Shaper</a:t>
+            </a:r>
+          </a:p>
+        </p:txBody>
+      </p:sp>
+      <p:sp>
+        <p:nvSpPr>
+          <p:cNvPr id="62" name="TextBox 61"/>
+          <p:cNvSpPr txBox="1"/>
+          <p:nvPr/>
+        </p:nvSpPr>
+        <p:spPr>
+          <a:xfrm>
+            <a:off x="6433603" y="2733032"/>
+            <a:ext cx="395040" cy="307777"/>
+          </a:xfrm>
+          <a:prstGeom prst="rect">
+            <a:avLst/>
+          </a:prstGeom>
+          <a:noFill/>
+        </p:spPr>
+        <p:txBody>
+          <a:bodyPr wrap="square" rtlCol="0">
+            <a:spAutoFit/>
+          </a:bodyPr>
+          <a:lstStyle/>
+          <a:p>
+            <a:r>
+              <a:rPr lang="en-US" sz="1400" dirty="0" smtClean="0"/>
+              <a:t>B5</a:t>
+            </a:r>
+            <a:endParaRPr lang="en-US" sz="1400" dirty="0"/>
+          </a:p>
+        </p:txBody>
+      </p:sp>
+      <p:sp>
+        <p:nvSpPr>
+          <p:cNvPr id="74" name="Rounded Rectangle 73"/>
+          <p:cNvSpPr/>
+          <p:nvPr/>
+        </p:nvSpPr>
+        <p:spPr>
+          <a:xfrm>
+            <a:off x="7275710" y="2728857"/>
+            <a:ext cx="1249896" cy="878890"/>
+          </a:xfrm>
+          <a:prstGeom prst="roundRect">
+            <a:avLst/>
+          </a:prstGeom>
+          <a:ln w="19050"/>
+        </p:spPr>
+        <p:style>
+          <a:lnRef idx="2">
+            <a:schemeClr val="dk1"/>
+          </a:lnRef>
+          <a:fillRef idx="1">
+            <a:schemeClr val="lt1"/>
+          </a:fillRef>
+          <a:effectRef idx="0">
+            <a:schemeClr val="dk1"/>
+          </a:effectRef>
+          <a:fontRef idx="minor">
+            <a:schemeClr val="dk1"/>
+          </a:fontRef>
+        </p:style>
+        <p:txBody>
+          <a:bodyPr rtlCol="0" anchor="ctr"/>
+          <a:lstStyle/>
+          <a:p>
+            <a:pPr algn="ctr"/>
+            <a:r>
+              <a:rPr lang="en-US" dirty="0" smtClean="0">
+                <a:latin typeface="+mj-lt"/>
+              </a:rPr>
+              <a:t>Fork</a:t>
+            </a:r>
+          </a:p>
+        </p:txBody>
+      </p:sp>
+      <p:sp>
+        <p:nvSpPr>
+          <p:cNvPr id="64" name="TextBox 63"/>
+          <p:cNvSpPr txBox="1"/>
+          <p:nvPr/>
+        </p:nvSpPr>
+        <p:spPr>
+          <a:xfrm>
+            <a:off x="8177269" y="2728857"/>
+            <a:ext cx="395040" cy="307777"/>
+          </a:xfrm>
+          <a:prstGeom prst="rect">
+            <a:avLst/>
+          </a:prstGeom>
+          <a:noFill/>
+        </p:spPr>
+        <p:txBody>
+          <a:bodyPr wrap="square" rtlCol="0">
+            <a:spAutoFit/>
+          </a:bodyPr>
+          <a:lstStyle/>
+          <a:p>
+            <a:r>
+              <a:rPr lang="en-US" sz="1400" dirty="0" smtClean="0"/>
+              <a:t>B6</a:t>
+            </a:r>
+            <a:endParaRPr lang="en-US" sz="1400" dirty="0"/>
+          </a:p>
+        </p:txBody>
+      </p:sp>
+      <p:grpSp>
+        <p:nvGrpSpPr>
+          <p:cNvPr id="103" name="Group 102"/>
+          <p:cNvGrpSpPr/>
+          <p:nvPr/>
+        </p:nvGrpSpPr>
+        <p:grpSpPr>
+          <a:xfrm>
+            <a:off x="10766326" y="2573042"/>
+            <a:ext cx="1316206" cy="870734"/>
+            <a:chOff x="10766326" y="2717047"/>
+            <a:chExt cx="1316206" cy="870734"/>
+          </a:xfrm>
+        </p:grpSpPr>
+        <p:sp>
+          <p:nvSpPr>
+            <p:cNvPr id="76" name="Rounded Rectangle 75"/>
+            <p:cNvSpPr/>
+            <p:nvPr/>
+          </p:nvSpPr>
+          <p:spPr>
+            <a:xfrm>
+              <a:off x="10766326" y="2717047"/>
+              <a:ext cx="1249896" cy="870734"/>
+            </a:xfrm>
+            <a:prstGeom prst="roundRect">
+              <a:avLst/>
+            </a:prstGeom>
+            <a:ln w="19050"/>
+          </p:spPr>
+          <p:style>
+            <a:lnRef idx="2">
+              <a:schemeClr val="dk1"/>
+            </a:lnRef>
+            <a:fillRef idx="1">
+              <a:schemeClr val="lt1"/>
+            </a:fillRef>
+            <a:effectRef idx="0">
+              <a:schemeClr val="dk1"/>
+            </a:effectRef>
+            <a:fontRef idx="minor">
+              <a:schemeClr val="dk1"/>
+            </a:fontRef>
+          </p:style>
+          <p:txBody>
+            <a:bodyPr rtlCol="0" anchor="ctr"/>
+            <a:lstStyle/>
+            <a:p>
+              <a:pPr algn="ctr"/>
+              <a:r>
+                <a:rPr lang="en-US" dirty="0" smtClean="0">
+                  <a:latin typeface="+mj-lt"/>
+                </a:rPr>
+                <a:t>Sink</a:t>
+              </a:r>
+            </a:p>
+          </p:txBody>
+        </p:sp>
+        <p:sp>
+          <p:nvSpPr>
+            <p:cNvPr id="65" name="TextBox 64"/>
+            <p:cNvSpPr txBox="1"/>
+            <p:nvPr/>
+          </p:nvSpPr>
+          <p:spPr>
+            <a:xfrm>
+              <a:off x="11687492" y="2728857"/>
+              <a:ext cx="395040" cy="307777"/>
+            </a:xfrm>
+            <a:prstGeom prst="rect">
+              <a:avLst/>
+            </a:prstGeom>
+            <a:noFill/>
+          </p:spPr>
+          <p:txBody>
+            <a:bodyPr wrap="square" rtlCol="0">
+              <a:spAutoFit/>
+            </a:bodyPr>
+            <a:lstStyle/>
+            <a:p>
+              <a:r>
+                <a:rPr lang="en-US" sz="1400" dirty="0" smtClean="0"/>
+                <a:t>B7</a:t>
+              </a:r>
+              <a:endParaRPr lang="en-US" sz="1400" dirty="0"/>
+            </a:p>
+          </p:txBody>
+        </p:sp>
+      </p:grpSp>
+      <p:cxnSp>
+        <p:nvCxnSpPr>
+          <p:cNvPr id="70" name="Elbow Connector 69"/>
+          <p:cNvCxnSpPr/>
+          <p:nvPr/>
+        </p:nvCxnSpPr>
+        <p:spPr>
+          <a:xfrm>
+            <a:off x="8525606" y="3371850"/>
+            <a:ext cx="939950" cy="858454"/>
+          </a:xfrm>
+          <a:prstGeom prst="bentConnector2">
+            <a:avLst/>
+          </a:prstGeom>
+          <a:ln w="19050">
+            <a:tailEnd type="triangle"/>
+          </a:ln>
+        </p:spPr>
+        <p:style>
+          <a:lnRef idx="1">
+            <a:schemeClr val="dk1"/>
+          </a:lnRef>
+          <a:fillRef idx="0">
+            <a:schemeClr val="dk1"/>
+          </a:fillRef>
+          <a:effectRef idx="0">
+            <a:schemeClr val="dk1"/>
+          </a:effectRef>
+          <a:fontRef idx="minor">
+            <a:schemeClr val="tx1"/>
+          </a:fontRef>
+        </p:style>
+      </p:cxnSp>
+      <mc:AlternateContent xmlns:mc="http://schemas.openxmlformats.org/markup-compatibility/2006">
+        <mc:Choice xmlns:a14="http://schemas.microsoft.com/office/drawing/2010/main" Requires="a14">
+          <p:sp>
+            <p:nvSpPr>
+              <p:cNvPr id="83" name="TextBox 82"/>
+              <p:cNvSpPr txBox="1"/>
+              <p:nvPr/>
+            </p:nvSpPr>
+            <p:spPr>
+              <a:xfrm>
+                <a:off x="8591178" y="3085538"/>
+                <a:ext cx="283667" cy="276999"/>
+              </a:xfrm>
+              <a:prstGeom prst="rect">
+                <a:avLst/>
+              </a:prstGeom>
+              <a:noFill/>
+            </p:spPr>
+            <p:txBody>
+              <a:bodyPr wrap="none" lIns="0" tIns="0" rIns="0" bIns="0" rtlCol="0">
+                <a:spAutoFit/>
+              </a:bodyPr>
+              <a:lstStyle/>
+              <a:p>
+                <a:pPr/>
+                <a14:m>
+                  <m:oMathPara xmlns:m="http://schemas.openxmlformats.org/officeDocument/2006/math">
+                    <m:oMathParaPr>
+                      <m:jc m:val="centerGroup"/>
+                    </m:oMathParaPr>
+                    <m:oMath xmlns:m="http://schemas.openxmlformats.org/officeDocument/2006/math">
+                      <m:sSub>
+                        <m:sSubPr>
+                          <m:ctrlPr>
+                            <a:rPr lang="en-US" i="1" smtClean="0">
+                              <a:latin typeface="Cambria Math" panose="02040503050406030204" pitchFamily="18" charset="0"/>
+                            </a:rPr>
+                          </m:ctrlPr>
+                        </m:sSubPr>
+                        <m:e>
+                          <m:r>
+                            <m:rPr>
+                              <m:sty m:val="p"/>
+                            </m:rPr>
+                            <a:rPr lang="en-US" b="0" i="0" smtClean="0">
+                              <a:latin typeface="Cambria Math" panose="02040503050406030204" pitchFamily="18" charset="0"/>
+                            </a:rPr>
+                            <m:t>S</m:t>
+                          </m:r>
+                        </m:e>
+                        <m:sub>
+                          <m:r>
+                            <a:rPr lang="en-US" b="0" i="1" smtClean="0">
+                              <a:latin typeface="Cambria Math" panose="02040503050406030204" pitchFamily="18" charset="0"/>
+                            </a:rPr>
+                            <m:t>6</m:t>
+                          </m:r>
+                        </m:sub>
+                      </m:sSub>
+                    </m:oMath>
+                  </m:oMathPara>
+                </a14:m>
+                <a:endParaRPr lang="en-US" dirty="0">
+                  <a:latin typeface="+mj-lt"/>
+                </a:endParaRPr>
+              </a:p>
+            </p:txBody>
+          </p:sp>
+        </mc:Choice>
+        <mc:Fallback>
+          <p:sp>
+            <p:nvSpPr>
+              <p:cNvPr id="83" name="TextBox 82"/>
+              <p:cNvSpPr txBox="1">
+                <a:spLocks noRot="1" noChangeAspect="1" noMove="1" noResize="1" noEditPoints="1" noAdjustHandles="1" noChangeArrowheads="1" noChangeShapeType="1" noTextEdit="1"/>
+              </p:cNvSpPr>
+              <p:nvPr/>
+            </p:nvSpPr>
+            <p:spPr>
+              <a:xfrm>
+                <a:off x="8591178" y="3085538"/>
+                <a:ext cx="283667" cy="276999"/>
+              </a:xfrm>
+              <a:prstGeom prst="rect">
+                <a:avLst/>
+              </a:prstGeom>
+              <a:blipFill>
+                <a:blip r:embed="rId8"/>
+                <a:stretch>
+                  <a:fillRect l="-17021" r="-6383" b="-15217"/>
+                </a:stretch>
+              </a:blipFill>
+            </p:spPr>
+            <p:txBody>
+              <a:bodyPr/>
+              <a:lstStyle/>
+              <a:p>
+                <a:r>
+                  <a:rPr lang="en-US">
+                    <a:noFill/>
+                  </a:rPr>
+                  <a:t> </a:t>
+                </a:r>
+              </a:p>
+            </p:txBody>
+          </p:sp>
+        </mc:Fallback>
+      </mc:AlternateContent>
+      <mc:AlternateContent xmlns:mc="http://schemas.openxmlformats.org/markup-compatibility/2006">
+        <mc:Choice xmlns:a14="http://schemas.microsoft.com/office/drawing/2010/main" Requires="a14">
+          <p:sp>
+            <p:nvSpPr>
+              <p:cNvPr id="84" name="TextBox 83"/>
+              <p:cNvSpPr txBox="1"/>
+              <p:nvPr/>
+            </p:nvSpPr>
+            <p:spPr>
+              <a:xfrm>
+                <a:off x="10285781" y="4381103"/>
+                <a:ext cx="283667" cy="276999"/>
+              </a:xfrm>
+              <a:prstGeom prst="rect">
+                <a:avLst/>
+              </a:prstGeom>
+              <a:noFill/>
+            </p:spPr>
+            <p:txBody>
+              <a:bodyPr wrap="none" lIns="0" tIns="0" rIns="0" bIns="0" rtlCol="0">
+                <a:spAutoFit/>
+              </a:bodyPr>
+              <a:lstStyle/>
+              <a:p>
+                <a:pPr/>
+                <a14:m>
+                  <m:oMathPara xmlns:m="http://schemas.openxmlformats.org/officeDocument/2006/math">
+                    <m:oMathParaPr>
+                      <m:jc m:val="centerGroup"/>
+                    </m:oMathParaPr>
+                    <m:oMath xmlns:m="http://schemas.openxmlformats.org/officeDocument/2006/math">
+                      <m:sSub>
+                        <m:sSubPr>
+                          <m:ctrlPr>
+                            <a:rPr lang="en-US" i="1" smtClean="0">
+                              <a:latin typeface="Cambria Math" panose="02040503050406030204" pitchFamily="18" charset="0"/>
+                            </a:rPr>
+                          </m:ctrlPr>
+                        </m:sSubPr>
+                        <m:e>
+                          <m:r>
+                            <m:rPr>
+                              <m:sty m:val="p"/>
+                            </m:rPr>
+                            <a:rPr lang="en-US" b="0" i="0" smtClean="0">
+                              <a:latin typeface="Cambria Math" panose="02040503050406030204" pitchFamily="18" charset="0"/>
+                            </a:rPr>
+                            <m:t>S</m:t>
+                          </m:r>
+                        </m:e>
+                        <m:sub>
+                          <m:r>
+                            <a:rPr lang="en-US" b="0" i="1" smtClean="0">
+                              <a:latin typeface="Cambria Math" panose="02040503050406030204" pitchFamily="18" charset="0"/>
+                            </a:rPr>
+                            <m:t>7</m:t>
+                          </m:r>
+                        </m:sub>
+                      </m:sSub>
+                    </m:oMath>
+                  </m:oMathPara>
+                </a14:m>
+                <a:endParaRPr lang="en-US" dirty="0">
+                  <a:latin typeface="+mj-lt"/>
+                </a:endParaRPr>
+              </a:p>
+            </p:txBody>
+          </p:sp>
+        </mc:Choice>
+        <mc:Fallback>
+          <p:sp>
+            <p:nvSpPr>
+              <p:cNvPr id="84" name="TextBox 83"/>
+              <p:cNvSpPr txBox="1">
+                <a:spLocks noRot="1" noChangeAspect="1" noMove="1" noResize="1" noEditPoints="1" noAdjustHandles="1" noChangeArrowheads="1" noChangeShapeType="1" noTextEdit="1"/>
+              </p:cNvSpPr>
+              <p:nvPr/>
+            </p:nvSpPr>
+            <p:spPr>
+              <a:xfrm>
+                <a:off x="10285781" y="4381103"/>
+                <a:ext cx="283667" cy="276999"/>
+              </a:xfrm>
+              <a:prstGeom prst="rect">
+                <a:avLst/>
+              </a:prstGeom>
+              <a:blipFill>
+                <a:blip r:embed="rId9"/>
+                <a:stretch>
+                  <a:fillRect l="-17021" r="-6383" b="-15556"/>
+                </a:stretch>
+              </a:blipFill>
+            </p:spPr>
+            <p:txBody>
+              <a:bodyPr/>
+              <a:lstStyle/>
+              <a:p>
+                <a:r>
+                  <a:rPr lang="en-US">
+                    <a:noFill/>
+                  </a:rPr>
+                  <a:t> </a:t>
+                </a:r>
+              </a:p>
+            </p:txBody>
+          </p:sp>
+        </mc:Fallback>
+      </mc:AlternateContent>
+      <p:sp>
+        <p:nvSpPr>
+          <p:cNvPr id="85" name="Rounded Rectangle 84"/>
+          <p:cNvSpPr/>
+          <p:nvPr/>
+        </p:nvSpPr>
+        <p:spPr>
+          <a:xfrm>
+            <a:off x="10766326" y="4227215"/>
+            <a:ext cx="1227406" cy="878890"/>
+          </a:xfrm>
+          <a:prstGeom prst="roundRect">
+            <a:avLst/>
+          </a:prstGeom>
+          <a:ln w="19050"/>
+        </p:spPr>
+        <p:style>
+          <a:lnRef idx="2">
+            <a:schemeClr val="dk1"/>
+          </a:lnRef>
+          <a:fillRef idx="1">
+            <a:schemeClr val="lt1"/>
+          </a:fillRef>
+          <a:effectRef idx="0">
+            <a:schemeClr val="dk1"/>
+          </a:effectRef>
+          <a:fontRef idx="minor">
+            <a:schemeClr val="dk1"/>
+          </a:fontRef>
+        </p:style>
+        <p:txBody>
+          <a:bodyPr rtlCol="0" anchor="ctr"/>
+          <a:lstStyle/>
+          <a:p>
+            <a:pPr algn="ctr"/>
+            <a:r>
+              <a:rPr lang="en-US" dirty="0" smtClean="0">
+                <a:latin typeface="+mj-lt"/>
+              </a:rPr>
+              <a:t>Sink</a:t>
+            </a:r>
+          </a:p>
+        </p:txBody>
+      </p:sp>
+      <p:sp>
+        <p:nvSpPr>
+          <p:cNvPr id="86" name="TextBox 85"/>
+          <p:cNvSpPr txBox="1"/>
+          <p:nvPr/>
+        </p:nvSpPr>
+        <p:spPr>
+          <a:xfrm>
+            <a:off x="11687492" y="4227215"/>
+            <a:ext cx="395040" cy="307777"/>
+          </a:xfrm>
+          <a:prstGeom prst="rect">
+            <a:avLst/>
+          </a:prstGeom>
+          <a:noFill/>
+        </p:spPr>
+        <p:txBody>
+          <a:bodyPr wrap="square" rtlCol="0">
+            <a:spAutoFit/>
+          </a:bodyPr>
+          <a:lstStyle/>
+          <a:p>
+            <a:r>
+              <a:rPr lang="en-US" sz="1400" dirty="0" smtClean="0"/>
+              <a:t>B9</a:t>
+            </a:r>
+            <a:endParaRPr lang="en-US" sz="1400" dirty="0"/>
+          </a:p>
+        </p:txBody>
+      </p:sp>
+      <p:sp>
+        <p:nvSpPr>
+          <p:cNvPr id="87" name="Rounded Rectangle 86"/>
+          <p:cNvSpPr/>
+          <p:nvPr/>
+        </p:nvSpPr>
+        <p:spPr>
+          <a:xfrm>
+            <a:off x="8797771" y="4227215"/>
+            <a:ext cx="1291132" cy="878890"/>
+          </a:xfrm>
+          <a:prstGeom prst="roundRect">
+            <a:avLst/>
+          </a:prstGeom>
+          <a:ln w="19050"/>
+        </p:spPr>
+        <p:style>
+          <a:lnRef idx="2">
+            <a:schemeClr val="dk1"/>
+          </a:lnRef>
+          <a:fillRef idx="1">
+            <a:schemeClr val="lt1"/>
+          </a:fillRef>
+          <a:effectRef idx="0">
+            <a:schemeClr val="dk1"/>
+          </a:effectRef>
+          <a:fontRef idx="minor">
+            <a:schemeClr val="dk1"/>
+          </a:fontRef>
+        </p:style>
+        <p:txBody>
+          <a:bodyPr rtlCol="0" anchor="ctr"/>
+          <a:lstStyle/>
+          <a:p>
+            <a:pPr algn="ctr"/>
+            <a:r>
+              <a:rPr lang="en-US" sz="1600" dirty="0" smtClean="0">
+                <a:latin typeface="+mj-lt"/>
+              </a:rPr>
+              <a:t>Hilbert Transformer</a:t>
+            </a:r>
+          </a:p>
+        </p:txBody>
+      </p:sp>
+      <p:sp>
+        <p:nvSpPr>
+          <p:cNvPr id="91" name="TextBox 90"/>
+          <p:cNvSpPr txBox="1"/>
+          <p:nvPr/>
+        </p:nvSpPr>
+        <p:spPr>
+          <a:xfrm>
+            <a:off x="9747939" y="4227215"/>
+            <a:ext cx="395040" cy="307777"/>
+          </a:xfrm>
+          <a:prstGeom prst="rect">
+            <a:avLst/>
+          </a:prstGeom>
+          <a:noFill/>
+        </p:spPr>
+        <p:txBody>
+          <a:bodyPr wrap="square" rtlCol="0">
+            <a:spAutoFit/>
+          </a:bodyPr>
+          <a:lstStyle/>
+          <a:p>
+            <a:r>
+              <a:rPr lang="en-US" sz="1400" dirty="0" smtClean="0"/>
+              <a:t>B8</a:t>
+            </a:r>
+            <a:endParaRPr lang="en-US" sz="1400" dirty="0"/>
           </a:p>
         </p:txBody>
       </p:sp>
@@ -4441,6 +4854,13 @@
   <p:clrMapOvr>
     <a:masterClrMapping/>
   </p:clrMapOvr>
+  <p:timing>
+    <p:tnLst>
+      <p:par>
+        <p:cTn id="1" dur="indefinite" restart="never" nodeType="tmRoot"/>
+      </p:par>
+    </p:tnLst>
+  </p:timing>
 </p:sld>
 </file>
 

</xml_diff>